<commit_message>
update brca case study
</commit_message>
<xml_diff>
--- a/analyses/casestudy1_brca/Figures/brcaResults_revised.pptx
+++ b/analyses/casestudy1_brca/Figures/brcaResults_revised.pptx
@@ -2,7 +2,7 @@
 <file path=ppt/presentation.xml><?xml version="1.0" encoding="utf-8"?>
 <p:presentation xmlns:a="http://schemas.openxmlformats.org/drawingml/2006/main" xmlns:r="http://schemas.openxmlformats.org/officeDocument/2006/relationships" xmlns:p="http://schemas.openxmlformats.org/presentationml/2006/main" saveSubsetFonts="1" autoCompressPictures="0">
   <p:sldMasterIdLst>
-    <p:sldMasterId id="2147483732" r:id="rId1"/>
+    <p:sldMasterId id="2147483744" r:id="rId1"/>
   </p:sldMasterIdLst>
   <p:notesMasterIdLst>
     <p:notesMasterId r:id="rId3"/>
@@ -10,7 +10,7 @@
   <p:sldIdLst>
     <p:sldId id="256" r:id="rId2"/>
   </p:sldIdLst>
-  <p:sldSz cx="5400675" cy="10799763"/>
+  <p:sldSz cx="5400675" cy="6840538"/>
   <p:notesSz cx="6858000" cy="9144000"/>
   <p:defaultTextStyle>
     <a:defPPr>
@@ -197,7 +197,7 @@
           <a:p>
             <a:fld id="{6A559A61-C327-6842-9F56-D3382ED1E30D}" type="datetimeFigureOut">
               <a:rPr lang="en-US" smtClean="0"/>
-              <a:t>11/14/18</a:t>
+              <a:t>11/21/18</a:t>
             </a:fld>
             <a:endParaRPr lang="en-US"/>
           </a:p>
@@ -215,8 +215,8 @@
         </p:nvSpPr>
         <p:spPr>
           <a:xfrm>
-            <a:off x="2657475" y="1143000"/>
-            <a:ext cx="1543050" cy="3086100"/>
+            <a:off x="2211388" y="1143000"/>
+            <a:ext cx="2435225" cy="3086100"/>
           </a:xfrm>
           <a:prstGeom prst="rect">
             <a:avLst/>
@@ -493,8 +493,8 @@
         </p:nvSpPr>
         <p:spPr>
           <a:xfrm>
-            <a:off x="405051" y="1767462"/>
-            <a:ext cx="4590574" cy="3759917"/>
+            <a:off x="405051" y="1119505"/>
+            <a:ext cx="4590574" cy="2381521"/>
           </a:xfrm>
         </p:spPr>
         <p:txBody>
@@ -525,8 +525,8 @@
         </p:nvSpPr>
         <p:spPr>
           <a:xfrm>
-            <a:off x="675085" y="5672376"/>
-            <a:ext cx="4050506" cy="2607442"/>
+            <a:off x="675085" y="3592866"/>
+            <a:ext cx="4050506" cy="1651546"/>
           </a:xfrm>
         </p:spPr>
         <p:txBody>
@@ -595,7 +595,7 @@
           <a:p>
             <a:fld id="{8A508DC1-056E-3D4C-9FFA-5331495A8A6D}" type="datetimeFigureOut">
               <a:rPr lang="en-US" smtClean="0"/>
-              <a:t>11/14/18</a:t>
+              <a:t>11/21/18</a:t>
             </a:fld>
             <a:endParaRPr lang="en-US"/>
           </a:p>
@@ -644,6 +644,11 @@
         </p:txBody>
       </p:sp>
     </p:spTree>
+    <p:extLst>
+      <p:ext uri="{BB962C8B-B14F-4D97-AF65-F5344CB8AC3E}">
+        <p14:creationId xmlns:p14="http://schemas.microsoft.com/office/powerpoint/2010/main" val="3563544897"/>
+      </p:ext>
+    </p:extLst>
   </p:cSld>
   <p:clrMapOvr>
     <a:masterClrMapping/>
@@ -709,7 +714,7 @@
             <a:pPr lvl="0"/>
             <a:r>
               <a:rPr lang="en-US"/>
-              <a:t>Click to edit Master text styles</a:t>
+              <a:t>Edit Master text styles</a:t>
             </a:r>
           </a:p>
           <a:p>
@@ -760,7 +765,7 @@
           <a:p>
             <a:fld id="{8A508DC1-056E-3D4C-9FFA-5331495A8A6D}" type="datetimeFigureOut">
               <a:rPr lang="en-US" smtClean="0"/>
-              <a:t>11/14/18</a:t>
+              <a:t>11/21/18</a:t>
             </a:fld>
             <a:endParaRPr lang="en-US"/>
           </a:p>
@@ -809,6 +814,11 @@
         </p:txBody>
       </p:sp>
     </p:spTree>
+    <p:extLst>
+      <p:ext uri="{BB962C8B-B14F-4D97-AF65-F5344CB8AC3E}">
+        <p14:creationId xmlns:p14="http://schemas.microsoft.com/office/powerpoint/2010/main" val="1888867772"/>
+      </p:ext>
+    </p:extLst>
   </p:cSld>
   <p:clrMapOvr>
     <a:masterClrMapping/>
@@ -845,8 +855,8 @@
         </p:nvSpPr>
         <p:spPr>
           <a:xfrm>
-            <a:off x="3864858" y="574987"/>
-            <a:ext cx="1164521" cy="9152300"/>
+            <a:off x="3864858" y="364195"/>
+            <a:ext cx="1164521" cy="5797040"/>
           </a:xfrm>
         </p:spPr>
         <p:txBody>
@@ -873,8 +883,8 @@
         </p:nvSpPr>
         <p:spPr>
           <a:xfrm>
-            <a:off x="371297" y="574987"/>
-            <a:ext cx="3426053" cy="9152300"/>
+            <a:off x="371297" y="364195"/>
+            <a:ext cx="3426053" cy="5797040"/>
           </a:xfrm>
         </p:spPr>
         <p:txBody>
@@ -884,7 +894,7 @@
             <a:pPr lvl="0"/>
             <a:r>
               <a:rPr lang="en-US"/>
-              <a:t>Click to edit Master text styles</a:t>
+              <a:t>Edit Master text styles</a:t>
             </a:r>
           </a:p>
           <a:p>
@@ -935,7 +945,7 @@
           <a:p>
             <a:fld id="{8A508DC1-056E-3D4C-9FFA-5331495A8A6D}" type="datetimeFigureOut">
               <a:rPr lang="en-US" smtClean="0"/>
-              <a:t>11/14/18</a:t>
+              <a:t>11/21/18</a:t>
             </a:fld>
             <a:endParaRPr lang="en-US"/>
           </a:p>
@@ -984,6 +994,11 @@
         </p:txBody>
       </p:sp>
     </p:spTree>
+    <p:extLst>
+      <p:ext uri="{BB962C8B-B14F-4D97-AF65-F5344CB8AC3E}">
+        <p14:creationId xmlns:p14="http://schemas.microsoft.com/office/powerpoint/2010/main" val="4277205337"/>
+      </p:ext>
+    </p:extLst>
   </p:cSld>
   <p:clrMapOvr>
     <a:masterClrMapping/>
@@ -1049,7 +1064,7 @@
             <a:pPr lvl="0"/>
             <a:r>
               <a:rPr lang="en-US"/>
-              <a:t>Click to edit Master text styles</a:t>
+              <a:t>Edit Master text styles</a:t>
             </a:r>
           </a:p>
           <a:p>
@@ -1100,7 +1115,7 @@
           <a:p>
             <a:fld id="{8A508DC1-056E-3D4C-9FFA-5331495A8A6D}" type="datetimeFigureOut">
               <a:rPr lang="en-US" smtClean="0"/>
-              <a:t>11/14/18</a:t>
+              <a:t>11/21/18</a:t>
             </a:fld>
             <a:endParaRPr lang="en-US"/>
           </a:p>
@@ -1149,6 +1164,11 @@
         </p:txBody>
       </p:sp>
     </p:spTree>
+    <p:extLst>
+      <p:ext uri="{BB962C8B-B14F-4D97-AF65-F5344CB8AC3E}">
+        <p14:creationId xmlns:p14="http://schemas.microsoft.com/office/powerpoint/2010/main" val="2540067510"/>
+      </p:ext>
+    </p:extLst>
   </p:cSld>
   <p:clrMapOvr>
     <a:masterClrMapping/>
@@ -1185,8 +1205,8 @@
         </p:nvSpPr>
         <p:spPr>
           <a:xfrm>
-            <a:off x="368484" y="2692444"/>
-            <a:ext cx="4658082" cy="4492401"/>
+            <a:off x="368484" y="1705386"/>
+            <a:ext cx="4658082" cy="2845473"/>
           </a:xfrm>
         </p:spPr>
         <p:txBody>
@@ -1217,8 +1237,8 @@
         </p:nvSpPr>
         <p:spPr>
           <a:xfrm>
-            <a:off x="368484" y="7227345"/>
-            <a:ext cx="4658082" cy="2362447"/>
+            <a:off x="368484" y="4577779"/>
+            <a:ext cx="4658082" cy="1496367"/>
           </a:xfrm>
         </p:spPr>
         <p:txBody>
@@ -1317,7 +1337,7 @@
             <a:pPr lvl="0"/>
             <a:r>
               <a:rPr lang="en-US"/>
-              <a:t>Click to edit Master text styles</a:t>
+              <a:t>Edit Master text styles</a:t>
             </a:r>
           </a:p>
         </p:txBody>
@@ -1339,7 +1359,7 @@
           <a:p>
             <a:fld id="{8A508DC1-056E-3D4C-9FFA-5331495A8A6D}" type="datetimeFigureOut">
               <a:rPr lang="en-US" smtClean="0"/>
-              <a:t>11/14/18</a:t>
+              <a:t>11/21/18</a:t>
             </a:fld>
             <a:endParaRPr lang="en-US"/>
           </a:p>
@@ -1388,6 +1408,11 @@
         </p:txBody>
       </p:sp>
     </p:spTree>
+    <p:extLst>
+      <p:ext uri="{BB962C8B-B14F-4D97-AF65-F5344CB8AC3E}">
+        <p14:creationId xmlns:p14="http://schemas.microsoft.com/office/powerpoint/2010/main" val="3240167115"/>
+      </p:ext>
+    </p:extLst>
   </p:cSld>
   <p:clrMapOvr>
     <a:masterClrMapping/>
@@ -1447,8 +1472,8 @@
         </p:nvSpPr>
         <p:spPr>
           <a:xfrm>
-            <a:off x="371296" y="2874937"/>
-            <a:ext cx="2295287" cy="6852350"/>
+            <a:off x="371296" y="1820976"/>
+            <a:ext cx="2295287" cy="4340259"/>
           </a:xfrm>
         </p:spPr>
         <p:txBody>
@@ -1458,7 +1483,7 @@
             <a:pPr lvl="0"/>
             <a:r>
               <a:rPr lang="en-US"/>
-              <a:t>Click to edit Master text styles</a:t>
+              <a:t>Edit Master text styles</a:t>
             </a:r>
           </a:p>
           <a:p>
@@ -1504,8 +1529,8 @@
         </p:nvSpPr>
         <p:spPr>
           <a:xfrm>
-            <a:off x="2734092" y="2874937"/>
-            <a:ext cx="2295287" cy="6852350"/>
+            <a:off x="2734092" y="1820976"/>
+            <a:ext cx="2295287" cy="4340259"/>
           </a:xfrm>
         </p:spPr>
         <p:txBody>
@@ -1515,7 +1540,7 @@
             <a:pPr lvl="0"/>
             <a:r>
               <a:rPr lang="en-US"/>
-              <a:t>Click to edit Master text styles</a:t>
+              <a:t>Edit Master text styles</a:t>
             </a:r>
           </a:p>
           <a:p>
@@ -1566,7 +1591,7 @@
           <a:p>
             <a:fld id="{8A508DC1-056E-3D4C-9FFA-5331495A8A6D}" type="datetimeFigureOut">
               <a:rPr lang="en-US" smtClean="0"/>
-              <a:t>11/14/18</a:t>
+              <a:t>11/21/18</a:t>
             </a:fld>
             <a:endParaRPr lang="en-US"/>
           </a:p>
@@ -1615,6 +1640,11 @@
         </p:txBody>
       </p:sp>
     </p:spTree>
+    <p:extLst>
+      <p:ext uri="{BB962C8B-B14F-4D97-AF65-F5344CB8AC3E}">
+        <p14:creationId xmlns:p14="http://schemas.microsoft.com/office/powerpoint/2010/main" val="1710291513"/>
+      </p:ext>
+    </p:extLst>
   </p:cSld>
   <p:clrMapOvr>
     <a:masterClrMapping/>
@@ -1651,8 +1681,8 @@
         </p:nvSpPr>
         <p:spPr>
           <a:xfrm>
-            <a:off x="372000" y="574990"/>
-            <a:ext cx="4658082" cy="2087455"/>
+            <a:off x="372000" y="364197"/>
+            <a:ext cx="4658082" cy="1322188"/>
           </a:xfrm>
         </p:spPr>
         <p:txBody>
@@ -1679,8 +1709,8 @@
         </p:nvSpPr>
         <p:spPr>
           <a:xfrm>
-            <a:off x="372001" y="2647443"/>
-            <a:ext cx="2284738" cy="1297471"/>
+            <a:off x="372001" y="1676882"/>
+            <a:ext cx="2284738" cy="821814"/>
           </a:xfrm>
         </p:spPr>
         <p:txBody>
@@ -1727,7 +1757,7 @@
             <a:pPr lvl="0"/>
             <a:r>
               <a:rPr lang="en-US"/>
-              <a:t>Click to edit Master text styles</a:t>
+              <a:t>Edit Master text styles</a:t>
             </a:r>
           </a:p>
         </p:txBody>
@@ -1744,8 +1774,8 @@
         </p:nvSpPr>
         <p:spPr>
           <a:xfrm>
-            <a:off x="372001" y="3944914"/>
-            <a:ext cx="2284738" cy="5802373"/>
+            <a:off x="372001" y="2498697"/>
+            <a:ext cx="2284738" cy="3675206"/>
           </a:xfrm>
         </p:spPr>
         <p:txBody>
@@ -1755,7 +1785,7 @@
             <a:pPr lvl="0"/>
             <a:r>
               <a:rPr lang="en-US"/>
-              <a:t>Click to edit Master text styles</a:t>
+              <a:t>Edit Master text styles</a:t>
             </a:r>
           </a:p>
           <a:p>
@@ -1801,8 +1831,8 @@
         </p:nvSpPr>
         <p:spPr>
           <a:xfrm>
-            <a:off x="2734092" y="2647443"/>
-            <a:ext cx="2295990" cy="1297471"/>
+            <a:off x="2734092" y="1676882"/>
+            <a:ext cx="2295990" cy="821814"/>
           </a:xfrm>
         </p:spPr>
         <p:txBody>
@@ -1849,7 +1879,7 @@
             <a:pPr lvl="0"/>
             <a:r>
               <a:rPr lang="en-US"/>
-              <a:t>Click to edit Master text styles</a:t>
+              <a:t>Edit Master text styles</a:t>
             </a:r>
           </a:p>
         </p:txBody>
@@ -1866,8 +1896,8 @@
         </p:nvSpPr>
         <p:spPr>
           <a:xfrm>
-            <a:off x="2734092" y="3944914"/>
-            <a:ext cx="2295990" cy="5802373"/>
+            <a:off x="2734092" y="2498697"/>
+            <a:ext cx="2295990" cy="3675206"/>
           </a:xfrm>
         </p:spPr>
         <p:txBody>
@@ -1877,7 +1907,7 @@
             <a:pPr lvl="0"/>
             <a:r>
               <a:rPr lang="en-US"/>
-              <a:t>Click to edit Master text styles</a:t>
+              <a:t>Edit Master text styles</a:t>
             </a:r>
           </a:p>
           <a:p>
@@ -1928,7 +1958,7 @@
           <a:p>
             <a:fld id="{8A508DC1-056E-3D4C-9FFA-5331495A8A6D}" type="datetimeFigureOut">
               <a:rPr lang="en-US" smtClean="0"/>
-              <a:t>11/14/18</a:t>
+              <a:t>11/21/18</a:t>
             </a:fld>
             <a:endParaRPr lang="en-US"/>
           </a:p>
@@ -1977,6 +2007,11 @@
         </p:txBody>
       </p:sp>
     </p:spTree>
+    <p:extLst>
+      <p:ext uri="{BB962C8B-B14F-4D97-AF65-F5344CB8AC3E}">
+        <p14:creationId xmlns:p14="http://schemas.microsoft.com/office/powerpoint/2010/main" val="1616213327"/>
+      </p:ext>
+    </p:extLst>
   </p:cSld>
   <p:clrMapOvr>
     <a:masterClrMapping/>
@@ -2041,7 +2076,7 @@
           <a:p>
             <a:fld id="{8A508DC1-056E-3D4C-9FFA-5331495A8A6D}" type="datetimeFigureOut">
               <a:rPr lang="en-US" smtClean="0"/>
-              <a:t>11/14/18</a:t>
+              <a:t>11/21/18</a:t>
             </a:fld>
             <a:endParaRPr lang="en-US"/>
           </a:p>
@@ -2090,6 +2125,11 @@
         </p:txBody>
       </p:sp>
     </p:spTree>
+    <p:extLst>
+      <p:ext uri="{BB962C8B-B14F-4D97-AF65-F5344CB8AC3E}">
+        <p14:creationId xmlns:p14="http://schemas.microsoft.com/office/powerpoint/2010/main" val="3638427545"/>
+      </p:ext>
+    </p:extLst>
   </p:cSld>
   <p:clrMapOvr>
     <a:masterClrMapping/>
@@ -2131,7 +2171,7 @@
           <a:p>
             <a:fld id="{8A508DC1-056E-3D4C-9FFA-5331495A8A6D}" type="datetimeFigureOut">
               <a:rPr lang="en-US" smtClean="0"/>
-              <a:t>11/14/18</a:t>
+              <a:t>11/21/18</a:t>
             </a:fld>
             <a:endParaRPr lang="en-US"/>
           </a:p>
@@ -2180,6 +2220,11 @@
         </p:txBody>
       </p:sp>
     </p:spTree>
+    <p:extLst>
+      <p:ext uri="{BB962C8B-B14F-4D97-AF65-F5344CB8AC3E}">
+        <p14:creationId xmlns:p14="http://schemas.microsoft.com/office/powerpoint/2010/main" val="2877680428"/>
+      </p:ext>
+    </p:extLst>
   </p:cSld>
   <p:clrMapOvr>
     <a:masterClrMapping/>
@@ -2216,8 +2261,8 @@
         </p:nvSpPr>
         <p:spPr>
           <a:xfrm>
-            <a:off x="372000" y="719984"/>
-            <a:ext cx="1741858" cy="2519945"/>
+            <a:off x="372000" y="456036"/>
+            <a:ext cx="1741858" cy="1596126"/>
           </a:xfrm>
         </p:spPr>
         <p:txBody>
@@ -2248,8 +2293,8 @@
         </p:nvSpPr>
         <p:spPr>
           <a:xfrm>
-            <a:off x="2295990" y="1554968"/>
-            <a:ext cx="2734092" cy="7674832"/>
+            <a:off x="2295990" y="984912"/>
+            <a:ext cx="2734092" cy="4861216"/>
           </a:xfrm>
         </p:spPr>
         <p:txBody>
@@ -2287,7 +2332,7 @@
             <a:pPr lvl="0"/>
             <a:r>
               <a:rPr lang="en-US"/>
-              <a:t>Click to edit Master text styles</a:t>
+              <a:t>Edit Master text styles</a:t>
             </a:r>
           </a:p>
           <a:p>
@@ -2333,8 +2378,8 @@
         </p:nvSpPr>
         <p:spPr>
           <a:xfrm>
-            <a:off x="372000" y="3239929"/>
-            <a:ext cx="1741858" cy="6002369"/>
+            <a:off x="372000" y="2052161"/>
+            <a:ext cx="1741858" cy="3801883"/>
           </a:xfrm>
         </p:spPr>
         <p:txBody>
@@ -2381,7 +2426,7 @@
             <a:pPr lvl="0"/>
             <a:r>
               <a:rPr lang="en-US"/>
-              <a:t>Click to edit Master text styles</a:t>
+              <a:t>Edit Master text styles</a:t>
             </a:r>
           </a:p>
         </p:txBody>
@@ -2403,7 +2448,7 @@
           <a:p>
             <a:fld id="{8A508DC1-056E-3D4C-9FFA-5331495A8A6D}" type="datetimeFigureOut">
               <a:rPr lang="en-US" smtClean="0"/>
-              <a:t>11/14/18</a:t>
+              <a:t>11/21/18</a:t>
             </a:fld>
             <a:endParaRPr lang="en-US"/>
           </a:p>
@@ -2452,6 +2497,11 @@
         </p:txBody>
       </p:sp>
     </p:spTree>
+    <p:extLst>
+      <p:ext uri="{BB962C8B-B14F-4D97-AF65-F5344CB8AC3E}">
+        <p14:creationId xmlns:p14="http://schemas.microsoft.com/office/powerpoint/2010/main" val="3556924337"/>
+      </p:ext>
+    </p:extLst>
   </p:cSld>
   <p:clrMapOvr>
     <a:masterClrMapping/>
@@ -2488,8 +2538,8 @@
         </p:nvSpPr>
         <p:spPr>
           <a:xfrm>
-            <a:off x="372000" y="719984"/>
-            <a:ext cx="1741858" cy="2519945"/>
+            <a:off x="372000" y="456036"/>
+            <a:ext cx="1741858" cy="1596126"/>
           </a:xfrm>
         </p:spPr>
         <p:txBody>
@@ -2520,8 +2570,8 @@
         </p:nvSpPr>
         <p:spPr>
           <a:xfrm>
-            <a:off x="2295990" y="1554968"/>
-            <a:ext cx="2734092" cy="7674832"/>
+            <a:off x="2295990" y="984912"/>
+            <a:ext cx="2734092" cy="4861216"/>
           </a:xfrm>
         </p:spPr>
         <p:txBody>
@@ -2567,7 +2617,7 @@
           <a:p>
             <a:r>
               <a:rPr lang="en-US"/>
-              <a:t>Drag picture to placeholder or click icon to add</a:t>
+              <a:t>Click icon to add picture</a:t>
             </a:r>
             <a:endParaRPr lang="en-US" dirty="0"/>
           </a:p>
@@ -2585,8 +2635,8 @@
         </p:nvSpPr>
         <p:spPr>
           <a:xfrm>
-            <a:off x="372000" y="3239929"/>
-            <a:ext cx="1741858" cy="6002369"/>
+            <a:off x="372000" y="2052161"/>
+            <a:ext cx="1741858" cy="3801883"/>
           </a:xfrm>
         </p:spPr>
         <p:txBody>
@@ -2633,7 +2683,7 @@
             <a:pPr lvl="0"/>
             <a:r>
               <a:rPr lang="en-US"/>
-              <a:t>Click to edit Master text styles</a:t>
+              <a:t>Edit Master text styles</a:t>
             </a:r>
           </a:p>
         </p:txBody>
@@ -2655,7 +2705,7 @@
           <a:p>
             <a:fld id="{8A508DC1-056E-3D4C-9FFA-5331495A8A6D}" type="datetimeFigureOut">
               <a:rPr lang="en-US" smtClean="0"/>
-              <a:t>11/14/18</a:t>
+              <a:t>11/21/18</a:t>
             </a:fld>
             <a:endParaRPr lang="en-US"/>
           </a:p>
@@ -2704,6 +2754,11 @@
         </p:txBody>
       </p:sp>
     </p:spTree>
+    <p:extLst>
+      <p:ext uri="{BB962C8B-B14F-4D97-AF65-F5344CB8AC3E}">
+        <p14:creationId xmlns:p14="http://schemas.microsoft.com/office/powerpoint/2010/main" val="4163044818"/>
+      </p:ext>
+    </p:extLst>
   </p:cSld>
   <p:clrMapOvr>
     <a:masterClrMapping/>
@@ -2745,8 +2800,8 @@
         </p:nvSpPr>
         <p:spPr>
           <a:xfrm>
-            <a:off x="371297" y="574990"/>
-            <a:ext cx="4658082" cy="2087455"/>
+            <a:off x="371297" y="364197"/>
+            <a:ext cx="4658082" cy="1322188"/>
           </a:xfrm>
           <a:prstGeom prst="rect">
             <a:avLst/>
@@ -2778,8 +2833,8 @@
         </p:nvSpPr>
         <p:spPr>
           <a:xfrm>
-            <a:off x="371297" y="2874937"/>
-            <a:ext cx="4658082" cy="6852350"/>
+            <a:off x="371297" y="1820976"/>
+            <a:ext cx="4658082" cy="4340259"/>
           </a:xfrm>
           <a:prstGeom prst="rect">
             <a:avLst/>
@@ -2794,7 +2849,7 @@
             <a:pPr lvl="0"/>
             <a:r>
               <a:rPr lang="en-US"/>
-              <a:t>Click to edit Master text styles</a:t>
+              <a:t>Edit Master text styles</a:t>
             </a:r>
           </a:p>
           <a:p>
@@ -2840,8 +2895,8 @@
         </p:nvSpPr>
         <p:spPr>
           <a:xfrm>
-            <a:off x="371296" y="10009783"/>
-            <a:ext cx="1215152" cy="574987"/>
+            <a:off x="371296" y="6340167"/>
+            <a:ext cx="1215152" cy="364195"/>
           </a:xfrm>
           <a:prstGeom prst="rect">
             <a:avLst/>
@@ -2863,7 +2918,7 @@
           <a:p>
             <a:fld id="{8A508DC1-056E-3D4C-9FFA-5331495A8A6D}" type="datetimeFigureOut">
               <a:rPr lang="en-US" smtClean="0"/>
-              <a:t>11/14/18</a:t>
+              <a:t>11/21/18</a:t>
             </a:fld>
             <a:endParaRPr lang="en-US"/>
           </a:p>
@@ -2881,8 +2936,8 @@
         </p:nvSpPr>
         <p:spPr>
           <a:xfrm>
-            <a:off x="1788974" y="10009783"/>
-            <a:ext cx="1822728" cy="574987"/>
+            <a:off x="1788974" y="6340167"/>
+            <a:ext cx="1822728" cy="364195"/>
           </a:xfrm>
           <a:prstGeom prst="rect">
             <a:avLst/>
@@ -2918,8 +2973,8 @@
         </p:nvSpPr>
         <p:spPr>
           <a:xfrm>
-            <a:off x="3814227" y="10009783"/>
-            <a:ext cx="1215152" cy="574987"/>
+            <a:off x="3814227" y="6340167"/>
+            <a:ext cx="1215152" cy="364195"/>
           </a:xfrm>
           <a:prstGeom prst="rect">
             <a:avLst/>
@@ -2950,23 +3005,23 @@
     </p:spTree>
     <p:extLst>
       <p:ext uri="{BB962C8B-B14F-4D97-AF65-F5344CB8AC3E}">
-        <p14:creationId xmlns:p14="http://schemas.microsoft.com/office/powerpoint/2010/main" val="1544104403"/>
+        <p14:creationId xmlns:p14="http://schemas.microsoft.com/office/powerpoint/2010/main" val="1324938044"/>
       </p:ext>
     </p:extLst>
   </p:cSld>
   <p:clrMap bg1="lt1" tx1="dk1" bg2="lt2" tx2="dk2" accent1="accent1" accent2="accent2" accent3="accent3" accent4="accent4" accent5="accent5" accent6="accent6" hlink="hlink" folHlink="folHlink"/>
   <p:sldLayoutIdLst>
-    <p:sldLayoutId id="2147483733" r:id="rId1"/>
-    <p:sldLayoutId id="2147483734" r:id="rId2"/>
-    <p:sldLayoutId id="2147483735" r:id="rId3"/>
-    <p:sldLayoutId id="2147483736" r:id="rId4"/>
-    <p:sldLayoutId id="2147483737" r:id="rId5"/>
-    <p:sldLayoutId id="2147483738" r:id="rId6"/>
-    <p:sldLayoutId id="2147483739" r:id="rId7"/>
-    <p:sldLayoutId id="2147483740" r:id="rId8"/>
-    <p:sldLayoutId id="2147483741" r:id="rId9"/>
-    <p:sldLayoutId id="2147483742" r:id="rId10"/>
-    <p:sldLayoutId id="2147483743" r:id="rId11"/>
+    <p:sldLayoutId id="2147483745" r:id="rId1"/>
+    <p:sldLayoutId id="2147483746" r:id="rId2"/>
+    <p:sldLayoutId id="2147483747" r:id="rId3"/>
+    <p:sldLayoutId id="2147483748" r:id="rId4"/>
+    <p:sldLayoutId id="2147483749" r:id="rId5"/>
+    <p:sldLayoutId id="2147483750" r:id="rId6"/>
+    <p:sldLayoutId id="2147483751" r:id="rId7"/>
+    <p:sldLayoutId id="2147483752" r:id="rId8"/>
+    <p:sldLayoutId id="2147483753" r:id="rId9"/>
+    <p:sldLayoutId id="2147483754" r:id="rId10"/>
+    <p:sldLayoutId id="2147483755" r:id="rId11"/>
   </p:sldLayoutIdLst>
   <p:txStyles>
     <p:titleStyle>
@@ -3284,49 +3339,19 @@
         </p:nvPicPr>
         <p:blipFill rotWithShape="1">
           <a:blip r:embed="rId2"/>
-          <a:srcRect b="50300"/>
+          <a:srcRect t="3333" b="50300"/>
           <a:stretch/>
         </p:blipFill>
         <p:spPr>
           <a:xfrm>
-            <a:off x="144741" y="0"/>
-            <a:ext cx="4856799" cy="3137983"/>
+            <a:off x="414826" y="139148"/>
+            <a:ext cx="4856799" cy="2927536"/>
           </a:xfrm>
           <a:prstGeom prst="rect">
             <a:avLst/>
           </a:prstGeom>
         </p:spPr>
       </p:pic>
-      <p:pic>
-        <p:nvPicPr>
-          <p:cNvPr id="16" name="Picture 15">
-            <a:extLst>
-              <a:ext uri="{FF2B5EF4-FFF2-40B4-BE49-F238E27FC236}">
-                <a16:creationId xmlns:a16="http://schemas.microsoft.com/office/drawing/2014/main" id="{BE328789-A537-C643-A566-3C721039EDD4}"/>
-              </a:ext>
-            </a:extLst>
-          </p:cNvPr>
-          <p:cNvPicPr>
-            <a:picLocks noChangeAspect="1"/>
-          </p:cNvPicPr>
-          <p:nvPr/>
-        </p:nvPicPr>
-        <p:blipFill>
-          <a:blip r:embed="rId3"/>
-          <a:stretch>
-            <a:fillRect/>
-          </a:stretch>
-        </p:blipFill>
-        <p:spPr>
-          <a:xfrm>
-            <a:off x="340659" y="6138882"/>
-            <a:ext cx="4660881" cy="4660881"/>
-          </a:xfrm>
-          <a:prstGeom prst="rect">
-            <a:avLst/>
-          </a:prstGeom>
-        </p:spPr>
-      </p:pic>
       <p:sp>
         <p:nvSpPr>
           <p:cNvPr id="17" name="TextBox 16"/>
@@ -3335,7 +3360,7 @@
         </p:nvSpPr>
         <p:spPr>
           <a:xfrm>
-            <a:off x="-48888" y="41726"/>
+            <a:off x="-42374" y="0"/>
             <a:ext cx="608665" cy="553998"/>
           </a:xfrm>
           <a:prstGeom prst="rect">
@@ -3369,7 +3394,7 @@
         </p:nvSpPr>
         <p:spPr>
           <a:xfrm>
-            <a:off x="-54948" y="3042625"/>
+            <a:off x="0" y="3309256"/>
             <a:ext cx="679461" cy="553998"/>
           </a:xfrm>
           <a:prstGeom prst="rect">
@@ -3390,39 +3415,6 @@
                 <a:cs typeface="Arial" charset="0"/>
               </a:rPr>
               <a:t>B.</a:t>
-            </a:r>
-          </a:p>
-        </p:txBody>
-      </p:sp>
-      <p:sp>
-        <p:nvSpPr>
-          <p:cNvPr id="19" name="TextBox 18"/>
-          <p:cNvSpPr txBox="1"/>
-          <p:nvPr/>
-        </p:nvSpPr>
-        <p:spPr>
-          <a:xfrm>
-            <a:off x="-54948" y="6043524"/>
-            <a:ext cx="584435" cy="553998"/>
-          </a:xfrm>
-          <a:prstGeom prst="rect">
-            <a:avLst/>
-          </a:prstGeom>
-          <a:noFill/>
-        </p:spPr>
-        <p:txBody>
-          <a:bodyPr wrap="square" rtlCol="0">
-            <a:spAutoFit/>
-          </a:bodyPr>
-          <a:lstStyle/>
-          <a:p>
-            <a:r>
-              <a:rPr lang="en-US" sz="3000" b="1" dirty="0">
-                <a:latin typeface="Arial" charset="0"/>
-                <a:ea typeface="Arial" charset="0"/>
-                <a:cs typeface="Arial" charset="0"/>
-              </a:rPr>
-              <a:t>C.</a:t>
             </a:r>
           </a:p>
         </p:txBody>
@@ -3442,14 +3434,14 @@
           <p:nvPr/>
         </p:nvPicPr>
         <p:blipFill rotWithShape="1">
-          <a:blip r:embed="rId4"/>
+          <a:blip r:embed="rId3"/>
           <a:srcRect l="11564" t="12428" r="11028" b="14204"/>
           <a:stretch/>
         </p:blipFill>
         <p:spPr>
           <a:xfrm>
-            <a:off x="1090845" y="3289763"/>
-            <a:ext cx="2964590" cy="2809879"/>
+            <a:off x="993913" y="3205832"/>
+            <a:ext cx="3653183" cy="3462537"/>
           </a:xfrm>
           <a:prstGeom prst="rect">
             <a:avLst/>

</xml_diff>